<commit_message>
ich habe es geaendert
</commit_message>
<xml_diff>
--- a/vita.pptx
+++ b/vita.pptx
@@ -268,7 +268,7 @@
           <a:p>
             <a:fld id="{B9823432-C4CC-4493-A10D-76EE4CA89F0A}" type="datetimeFigureOut">
               <a:rPr lang="de-DE" smtClean="0"/>
-              <a:t>17.02.2023</a:t>
+              <a:t>21.02.2023</a:t>
             </a:fld>
             <a:endParaRPr lang="de-DE"/>
           </a:p>
@@ -468,7 +468,7 @@
           <a:p>
             <a:fld id="{B9823432-C4CC-4493-A10D-76EE4CA89F0A}" type="datetimeFigureOut">
               <a:rPr lang="de-DE" smtClean="0"/>
-              <a:t>17.02.2023</a:t>
+              <a:t>21.02.2023</a:t>
             </a:fld>
             <a:endParaRPr lang="de-DE"/>
           </a:p>
@@ -678,7 +678,7 @@
           <a:p>
             <a:fld id="{B9823432-C4CC-4493-A10D-76EE4CA89F0A}" type="datetimeFigureOut">
               <a:rPr lang="de-DE" smtClean="0"/>
-              <a:t>17.02.2023</a:t>
+              <a:t>21.02.2023</a:t>
             </a:fld>
             <a:endParaRPr lang="de-DE"/>
           </a:p>
@@ -878,7 +878,7 @@
           <a:p>
             <a:fld id="{B9823432-C4CC-4493-A10D-76EE4CA89F0A}" type="datetimeFigureOut">
               <a:rPr lang="de-DE" smtClean="0"/>
-              <a:t>17.02.2023</a:t>
+              <a:t>21.02.2023</a:t>
             </a:fld>
             <a:endParaRPr lang="de-DE"/>
           </a:p>
@@ -1154,7 +1154,7 @@
           <a:p>
             <a:fld id="{B9823432-C4CC-4493-A10D-76EE4CA89F0A}" type="datetimeFigureOut">
               <a:rPr lang="de-DE" smtClean="0"/>
-              <a:t>17.02.2023</a:t>
+              <a:t>21.02.2023</a:t>
             </a:fld>
             <a:endParaRPr lang="de-DE"/>
           </a:p>
@@ -1422,7 +1422,7 @@
           <a:p>
             <a:fld id="{B9823432-C4CC-4493-A10D-76EE4CA89F0A}" type="datetimeFigureOut">
               <a:rPr lang="de-DE" smtClean="0"/>
-              <a:t>17.02.2023</a:t>
+              <a:t>21.02.2023</a:t>
             </a:fld>
             <a:endParaRPr lang="de-DE"/>
           </a:p>
@@ -1837,7 +1837,7 @@
           <a:p>
             <a:fld id="{B9823432-C4CC-4493-A10D-76EE4CA89F0A}" type="datetimeFigureOut">
               <a:rPr lang="de-DE" smtClean="0"/>
-              <a:t>17.02.2023</a:t>
+              <a:t>21.02.2023</a:t>
             </a:fld>
             <a:endParaRPr lang="de-DE"/>
           </a:p>
@@ -1979,7 +1979,7 @@
           <a:p>
             <a:fld id="{B9823432-C4CC-4493-A10D-76EE4CA89F0A}" type="datetimeFigureOut">
               <a:rPr lang="de-DE" smtClean="0"/>
-              <a:t>17.02.2023</a:t>
+              <a:t>21.02.2023</a:t>
             </a:fld>
             <a:endParaRPr lang="de-DE"/>
           </a:p>
@@ -2092,7 +2092,7 @@
           <a:p>
             <a:fld id="{B9823432-C4CC-4493-A10D-76EE4CA89F0A}" type="datetimeFigureOut">
               <a:rPr lang="de-DE" smtClean="0"/>
-              <a:t>17.02.2023</a:t>
+              <a:t>21.02.2023</a:t>
             </a:fld>
             <a:endParaRPr lang="de-DE"/>
           </a:p>
@@ -2405,7 +2405,7 @@
           <a:p>
             <a:fld id="{B9823432-C4CC-4493-A10D-76EE4CA89F0A}" type="datetimeFigureOut">
               <a:rPr lang="de-DE" smtClean="0"/>
-              <a:t>17.02.2023</a:t>
+              <a:t>21.02.2023</a:t>
             </a:fld>
             <a:endParaRPr lang="de-DE"/>
           </a:p>
@@ -2694,7 +2694,7 @@
           <a:p>
             <a:fld id="{B9823432-C4CC-4493-A10D-76EE4CA89F0A}" type="datetimeFigureOut">
               <a:rPr lang="de-DE" smtClean="0"/>
-              <a:t>17.02.2023</a:t>
+              <a:t>21.02.2023</a:t>
             </a:fld>
             <a:endParaRPr lang="de-DE"/>
           </a:p>
@@ -2937,7 +2937,7 @@
           <a:p>
             <a:fld id="{B9823432-C4CC-4493-A10D-76EE4CA89F0A}" type="datetimeFigureOut">
               <a:rPr lang="de-DE" smtClean="0"/>
-              <a:t>17.02.2023</a:t>
+              <a:t>21.02.2023</a:t>
             </a:fld>
             <a:endParaRPr lang="de-DE"/>
           </a:p>
@@ -3844,6 +3844,10 @@
           <a:bodyPr/>
           <a:lstStyle/>
           <a:p>
+            <a:r>
+              <a:rPr lang="de-DE"/>
+              <a:t>fhghfhfghfgh</a:t>
+            </a:r>
             <a:endParaRPr lang="de-DE" dirty="0"/>
           </a:p>
         </p:txBody>

</xml_diff>

<commit_message>
Ich habe es geändert
</commit_message>
<xml_diff>
--- a/vita.pptx
+++ b/vita.pptx
@@ -268,7 +268,7 @@
           <a:p>
             <a:fld id="{B9823432-C4CC-4493-A10D-76EE4CA89F0A}" type="datetimeFigureOut">
               <a:rPr lang="de-DE" smtClean="0"/>
-              <a:t>17.02.2023</a:t>
+              <a:t>21.02.2023</a:t>
             </a:fld>
             <a:endParaRPr lang="de-DE"/>
           </a:p>
@@ -468,7 +468,7 @@
           <a:p>
             <a:fld id="{B9823432-C4CC-4493-A10D-76EE4CA89F0A}" type="datetimeFigureOut">
               <a:rPr lang="de-DE" smtClean="0"/>
-              <a:t>17.02.2023</a:t>
+              <a:t>21.02.2023</a:t>
             </a:fld>
             <a:endParaRPr lang="de-DE"/>
           </a:p>
@@ -678,7 +678,7 @@
           <a:p>
             <a:fld id="{B9823432-C4CC-4493-A10D-76EE4CA89F0A}" type="datetimeFigureOut">
               <a:rPr lang="de-DE" smtClean="0"/>
-              <a:t>17.02.2023</a:t>
+              <a:t>21.02.2023</a:t>
             </a:fld>
             <a:endParaRPr lang="de-DE"/>
           </a:p>
@@ -878,7 +878,7 @@
           <a:p>
             <a:fld id="{B9823432-C4CC-4493-A10D-76EE4CA89F0A}" type="datetimeFigureOut">
               <a:rPr lang="de-DE" smtClean="0"/>
-              <a:t>17.02.2023</a:t>
+              <a:t>21.02.2023</a:t>
             </a:fld>
             <a:endParaRPr lang="de-DE"/>
           </a:p>
@@ -1154,7 +1154,7 @@
           <a:p>
             <a:fld id="{B9823432-C4CC-4493-A10D-76EE4CA89F0A}" type="datetimeFigureOut">
               <a:rPr lang="de-DE" smtClean="0"/>
-              <a:t>17.02.2023</a:t>
+              <a:t>21.02.2023</a:t>
             </a:fld>
             <a:endParaRPr lang="de-DE"/>
           </a:p>
@@ -1422,7 +1422,7 @@
           <a:p>
             <a:fld id="{B9823432-C4CC-4493-A10D-76EE4CA89F0A}" type="datetimeFigureOut">
               <a:rPr lang="de-DE" smtClean="0"/>
-              <a:t>17.02.2023</a:t>
+              <a:t>21.02.2023</a:t>
             </a:fld>
             <a:endParaRPr lang="de-DE"/>
           </a:p>
@@ -1837,7 +1837,7 @@
           <a:p>
             <a:fld id="{B9823432-C4CC-4493-A10D-76EE4CA89F0A}" type="datetimeFigureOut">
               <a:rPr lang="de-DE" smtClean="0"/>
-              <a:t>17.02.2023</a:t>
+              <a:t>21.02.2023</a:t>
             </a:fld>
             <a:endParaRPr lang="de-DE"/>
           </a:p>
@@ -1979,7 +1979,7 @@
           <a:p>
             <a:fld id="{B9823432-C4CC-4493-A10D-76EE4CA89F0A}" type="datetimeFigureOut">
               <a:rPr lang="de-DE" smtClean="0"/>
-              <a:t>17.02.2023</a:t>
+              <a:t>21.02.2023</a:t>
             </a:fld>
             <a:endParaRPr lang="de-DE"/>
           </a:p>
@@ -2092,7 +2092,7 @@
           <a:p>
             <a:fld id="{B9823432-C4CC-4493-A10D-76EE4CA89F0A}" type="datetimeFigureOut">
               <a:rPr lang="de-DE" smtClean="0"/>
-              <a:t>17.02.2023</a:t>
+              <a:t>21.02.2023</a:t>
             </a:fld>
             <a:endParaRPr lang="de-DE"/>
           </a:p>
@@ -2405,7 +2405,7 @@
           <a:p>
             <a:fld id="{B9823432-C4CC-4493-A10D-76EE4CA89F0A}" type="datetimeFigureOut">
               <a:rPr lang="de-DE" smtClean="0"/>
-              <a:t>17.02.2023</a:t>
+              <a:t>21.02.2023</a:t>
             </a:fld>
             <a:endParaRPr lang="de-DE"/>
           </a:p>
@@ -2694,7 +2694,7 @@
           <a:p>
             <a:fld id="{B9823432-C4CC-4493-A10D-76EE4CA89F0A}" type="datetimeFigureOut">
               <a:rPr lang="de-DE" smtClean="0"/>
-              <a:t>17.02.2023</a:t>
+              <a:t>21.02.2023</a:t>
             </a:fld>
             <a:endParaRPr lang="de-DE"/>
           </a:p>
@@ -2937,7 +2937,7 @@
           <a:p>
             <a:fld id="{B9823432-C4CC-4493-A10D-76EE4CA89F0A}" type="datetimeFigureOut">
               <a:rPr lang="de-DE" smtClean="0"/>
-              <a:t>17.02.2023</a:t>
+              <a:t>21.02.2023</a:t>
             </a:fld>
             <a:endParaRPr lang="de-DE"/>
           </a:p>
@@ -3927,7 +3927,14 @@
           <a:bodyPr/>
           <a:lstStyle/>
           <a:p>
-            <a:endParaRPr lang="de-DE"/>
+            <a:r>
+              <a:rPr lang="de-DE" dirty="0"/>
+              <a:t>Ich bin </a:t>
+            </a:r>
+            <a:r>
+              <a:rPr lang="de-DE"/>
+              <a:t>Navid Ahmadi</a:t>
+            </a:r>
           </a:p>
         </p:txBody>
       </p:sp>

</xml_diff>

<commit_message>
Nadine fügt erklärung fur Database Design hinzu
</commit_message>
<xml_diff>
--- a/vita.pptx
+++ b/vita.pptx
@@ -268,7 +268,7 @@
           <a:p>
             <a:fld id="{B9823432-C4CC-4493-A10D-76EE4CA89F0A}" type="datetimeFigureOut">
               <a:rPr lang="de-DE" smtClean="0"/>
-              <a:t>21.02.2023</a:t>
+              <a:t>22.02.2023</a:t>
             </a:fld>
             <a:endParaRPr lang="de-DE"/>
           </a:p>
@@ -468,7 +468,7 @@
           <a:p>
             <a:fld id="{B9823432-C4CC-4493-A10D-76EE4CA89F0A}" type="datetimeFigureOut">
               <a:rPr lang="de-DE" smtClean="0"/>
-              <a:t>21.02.2023</a:t>
+              <a:t>22.02.2023</a:t>
             </a:fld>
             <a:endParaRPr lang="de-DE"/>
           </a:p>
@@ -678,7 +678,7 @@
           <a:p>
             <a:fld id="{B9823432-C4CC-4493-A10D-76EE4CA89F0A}" type="datetimeFigureOut">
               <a:rPr lang="de-DE" smtClean="0"/>
-              <a:t>21.02.2023</a:t>
+              <a:t>22.02.2023</a:t>
             </a:fld>
             <a:endParaRPr lang="de-DE"/>
           </a:p>
@@ -878,7 +878,7 @@
           <a:p>
             <a:fld id="{B9823432-C4CC-4493-A10D-76EE4CA89F0A}" type="datetimeFigureOut">
               <a:rPr lang="de-DE" smtClean="0"/>
-              <a:t>21.02.2023</a:t>
+              <a:t>22.02.2023</a:t>
             </a:fld>
             <a:endParaRPr lang="de-DE"/>
           </a:p>
@@ -1154,7 +1154,7 @@
           <a:p>
             <a:fld id="{B9823432-C4CC-4493-A10D-76EE4CA89F0A}" type="datetimeFigureOut">
               <a:rPr lang="de-DE" smtClean="0"/>
-              <a:t>21.02.2023</a:t>
+              <a:t>22.02.2023</a:t>
             </a:fld>
             <a:endParaRPr lang="de-DE"/>
           </a:p>
@@ -1422,7 +1422,7 @@
           <a:p>
             <a:fld id="{B9823432-C4CC-4493-A10D-76EE4CA89F0A}" type="datetimeFigureOut">
               <a:rPr lang="de-DE" smtClean="0"/>
-              <a:t>21.02.2023</a:t>
+              <a:t>22.02.2023</a:t>
             </a:fld>
             <a:endParaRPr lang="de-DE"/>
           </a:p>
@@ -1837,7 +1837,7 @@
           <a:p>
             <a:fld id="{B9823432-C4CC-4493-A10D-76EE4CA89F0A}" type="datetimeFigureOut">
               <a:rPr lang="de-DE" smtClean="0"/>
-              <a:t>21.02.2023</a:t>
+              <a:t>22.02.2023</a:t>
             </a:fld>
             <a:endParaRPr lang="de-DE"/>
           </a:p>
@@ -1979,7 +1979,7 @@
           <a:p>
             <a:fld id="{B9823432-C4CC-4493-A10D-76EE4CA89F0A}" type="datetimeFigureOut">
               <a:rPr lang="de-DE" smtClean="0"/>
-              <a:t>21.02.2023</a:t>
+              <a:t>22.02.2023</a:t>
             </a:fld>
             <a:endParaRPr lang="de-DE"/>
           </a:p>
@@ -2092,7 +2092,7 @@
           <a:p>
             <a:fld id="{B9823432-C4CC-4493-A10D-76EE4CA89F0A}" type="datetimeFigureOut">
               <a:rPr lang="de-DE" smtClean="0"/>
-              <a:t>21.02.2023</a:t>
+              <a:t>22.02.2023</a:t>
             </a:fld>
             <a:endParaRPr lang="de-DE"/>
           </a:p>
@@ -2405,7 +2405,7 @@
           <a:p>
             <a:fld id="{B9823432-C4CC-4493-A10D-76EE4CA89F0A}" type="datetimeFigureOut">
               <a:rPr lang="de-DE" smtClean="0"/>
-              <a:t>21.02.2023</a:t>
+              <a:t>22.02.2023</a:t>
             </a:fld>
             <a:endParaRPr lang="de-DE"/>
           </a:p>
@@ -2694,7 +2694,7 @@
           <a:p>
             <a:fld id="{B9823432-C4CC-4493-A10D-76EE4CA89F0A}" type="datetimeFigureOut">
               <a:rPr lang="de-DE" smtClean="0"/>
-              <a:t>21.02.2023</a:t>
+              <a:t>22.02.2023</a:t>
             </a:fld>
             <a:endParaRPr lang="de-DE"/>
           </a:p>
@@ -2937,7 +2937,7 @@
           <a:p>
             <a:fld id="{B9823432-C4CC-4493-A10D-76EE4CA89F0A}" type="datetimeFigureOut">
               <a:rPr lang="de-DE" smtClean="0"/>
-              <a:t>21.02.2023</a:t>
+              <a:t>22.02.2023</a:t>
             </a:fld>
             <a:endParaRPr lang="de-DE"/>
           </a:p>
@@ -3385,15 +3385,7 @@
             </a:r>
             <a:r>
               <a:rPr lang="de-DE" dirty="0"/>
-              <a:t> </a:t>
-            </a:r>
-            <a:r>
-              <a:rPr lang="de-DE" dirty="0" err="1"/>
-              <a:t>git</a:t>
-            </a:r>
-            <a:r>
-              <a:rPr lang="de-DE" dirty="0"/>
-              <a:t> </a:t>
+              <a:t> git </a:t>
             </a:r>
             <a:r>
               <a:rPr lang="de-DE" dirty="0" err="1"/>
@@ -3548,12 +3540,8 @@
           <a:lstStyle/>
           <a:p>
             <a:r>
-              <a:rPr lang="de-DE" dirty="0" err="1"/>
-              <a:t>git</a:t>
-            </a:r>
-            <a:r>
               <a:rPr lang="de-DE" dirty="0"/>
-              <a:t> pull </a:t>
+              <a:t>git pull </a:t>
             </a:r>
           </a:p>
           <a:p>
@@ -3573,12 +3561,8 @@
           </a:p>
           <a:p>
             <a:r>
-              <a:rPr lang="de-DE" dirty="0" err="1"/>
-              <a:t>git</a:t>
-            </a:r>
-            <a:r>
               <a:rPr lang="de-DE" dirty="0"/>
-              <a:t> push </a:t>
+              <a:t>git push </a:t>
             </a:r>
             <a:r>
               <a:rPr lang="de-DE" dirty="0" err="1"/>
@@ -3664,12 +3648,8 @@
           </a:p>
           <a:p>
             <a:r>
-              <a:rPr lang="de-DE" dirty="0" err="1"/>
-              <a:t>git</a:t>
-            </a:r>
-            <a:r>
               <a:rPr lang="de-DE" dirty="0"/>
-              <a:t> </a:t>
+              <a:t>git </a:t>
             </a:r>
             <a:r>
               <a:rPr lang="de-DE" dirty="0" err="1"/>
@@ -14617,7 +14597,7 @@
           <a:lstStyle/>
           <a:p>
             <a:r>
-              <a:rPr lang="en-US" sz="7200" kern="1200">
+              <a:rPr lang="en-US" sz="7200" kern="1200" dirty="0">
                 <a:solidFill>
                   <a:schemeClr val="bg1"/>
                 </a:solidFill>
@@ -14662,9 +14642,88 @@
               <a:buNone/>
             </a:pPr>
             <a:r>
-              <a:rPr lang="en-US" sz="2400" kern="1200">
+              <a:rPr lang="de-DE" sz="3300" b="1" i="1" strike="noStrike" dirty="0">
                 <a:solidFill>
-                  <a:schemeClr val="bg1"/>
+                  <a:schemeClr val="tx2">
+                    <a:lumMod val="20000"/>
+                    <a:lumOff val="80000"/>
+                  </a:schemeClr>
+                </a:solidFill>
+                <a:effectLst/>
+                <a:latin typeface="Comic Sans MS" panose="030F0702030302020204" pitchFamily="66" charset="0"/>
+                <a:hlinkClick r:id="rId3" tooltip="de.wikipedia.org">
+                  <a:extLst>
+                    <a:ext uri="{A12FA001-AC4F-418D-AE19-62706E023703}">
+                      <ahyp:hlinkClr xmlns:ahyp="http://schemas.microsoft.com/office/drawing/2018/hyperlinkcolor" val="tx"/>
+                    </a:ext>
+                  </a:extLst>
+                </a:hlinkClick>
+              </a:rPr>
+              <a:t>Datenbankdesign ist das Planen und Erstellen einer Datenbank</a:t>
+            </a:r>
+          </a:p>
+          <a:p>
+            <a:pPr marL="0" indent="0">
+              <a:buNone/>
+            </a:pPr>
+            <a:endParaRPr lang="de-DE" sz="3300" b="1" i="1" strike="noStrike" dirty="0">
+              <a:solidFill>
+                <a:schemeClr val="tx2">
+                  <a:lumMod val="20000"/>
+                  <a:lumOff val="80000"/>
+                </a:schemeClr>
+              </a:solidFill>
+              <a:effectLst/>
+              <a:latin typeface="Comic Sans MS" panose="030F0702030302020204" pitchFamily="66" charset="0"/>
+              <a:hlinkClick r:id="rId3" tooltip="de.wikipedia.org">
+                <a:extLst>
+                  <a:ext uri="{A12FA001-AC4F-418D-AE19-62706E023703}">
+                    <ahyp:hlinkClr xmlns:ahyp="http://schemas.microsoft.com/office/drawing/2018/hyperlinkcolor" val="tx"/>
+                  </a:ext>
+                </a:extLst>
+              </a:hlinkClick>
+            </a:endParaRPr>
+          </a:p>
+        </p:txBody>
+      </p:sp>
+      <p:sp>
+        <p:nvSpPr>
+          <p:cNvPr id="4" name="Textfeld 3">
+            <a:extLst>
+              <a:ext uri="{FF2B5EF4-FFF2-40B4-BE49-F238E27FC236}">
+                <a16:creationId xmlns:a16="http://schemas.microsoft.com/office/drawing/2014/main" id="{29EFE4BA-54D5-FE4C-5366-592D4D6CB7D2}"/>
+              </a:ext>
+            </a:extLst>
+          </p:cNvPr>
+          <p:cNvSpPr txBox="1"/>
+          <p:nvPr/>
+        </p:nvSpPr>
+        <p:spPr>
+          <a:xfrm>
+            <a:off x="10404764" y="6207590"/>
+            <a:ext cx="2757054" cy="369332"/>
+          </a:xfrm>
+          <a:prstGeom prst="rect">
+            <a:avLst/>
+          </a:prstGeom>
+          <a:noFill/>
+        </p:spPr>
+        <p:txBody>
+          <a:bodyPr wrap="square" rtlCol="0">
+            <a:spAutoFit/>
+          </a:bodyPr>
+          <a:lstStyle/>
+          <a:p>
+            <a:pPr marL="0" indent="0">
+              <a:buNone/>
+            </a:pPr>
+            <a:r>
+              <a:rPr lang="en-US" sz="1800" kern="1200" dirty="0">
+                <a:solidFill>
+                  <a:schemeClr val="accent1">
+                    <a:lumMod val="60000"/>
+                    <a:lumOff val="40000"/>
+                  </a:schemeClr>
                 </a:solidFill>
                 <a:latin typeface="+mn-lt"/>
                 <a:ea typeface="+mn-ea"/>

</xml_diff>